<commit_message>
More debugging, code maintenance & documentation updates
</commit_message>
<xml_diff>
--- a/DDT Selenium Java GA.pptx
+++ b/DDT Selenium Java GA.pptx
@@ -5,7 +5,7 @@
     <p:sldMasterId id="2147483648" r:id="rId1"/>
   </p:sldMasterIdLst>
   <p:notesMasterIdLst>
-    <p:notesMasterId r:id="rId14"/>
+    <p:notesMasterId r:id="rId13"/>
   </p:notesMasterIdLst>
   <p:sldIdLst>
     <p:sldId id="256" r:id="rId2"/>
@@ -19,7 +19,6 @@
     <p:sldId id="277" r:id="rId10"/>
     <p:sldId id="276" r:id="rId11"/>
     <p:sldId id="278" r:id="rId12"/>
-    <p:sldId id="279" r:id="rId13"/>
   </p:sldIdLst>
   <p:sldSz cx="9144000" cy="6858000" type="screen4x3"/>
   <p:notesSz cx="6858000" cy="9144000"/>
@@ -201,14 +200,14 @@
           <a:effectLst/>
           <a:extLst>
             <a:ext uri="{909E8E84-426E-40DD-AFC4-6F175D3DCCD1}">
-              <a14:hiddenFill xmlns:a14="http://schemas.microsoft.com/office/drawing/2010/main" xmlns="">
+              <a14:hiddenFill xmlns="" xmlns:a14="http://schemas.microsoft.com/office/drawing/2010/main">
                 <a:solidFill>
                   <a:schemeClr val="accent1"/>
                 </a:solidFill>
               </a14:hiddenFill>
             </a:ext>
             <a:ext uri="{91240B29-F687-4F45-9708-019B960494DF}">
-              <a14:hiddenLine xmlns:a14="http://schemas.microsoft.com/office/drawing/2010/main" xmlns="" w="9525">
+              <a14:hiddenLine xmlns="" xmlns:a14="http://schemas.microsoft.com/office/drawing/2010/main" w="9525">
                 <a:solidFill>
                   <a:schemeClr val="tx1"/>
                 </a:solidFill>
@@ -218,7 +217,7 @@
               </a14:hiddenLine>
             </a:ext>
             <a:ext uri="{AF507438-7753-43E0-B8FC-AC1667EBCBE1}">
-              <a14:hiddenEffects xmlns:a14="http://schemas.microsoft.com/office/drawing/2010/main" xmlns="">
+              <a14:hiddenEffects xmlns="" xmlns:a14="http://schemas.microsoft.com/office/drawing/2010/main">
                 <a:effectLst>
                   <a:outerShdw dist="35921" dir="2700000" algn="ctr" rotWithShape="0">
                     <a:schemeClr val="bg2"/>
@@ -274,14 +273,14 @@
           <a:effectLst/>
           <a:extLst>
             <a:ext uri="{909E8E84-426E-40DD-AFC4-6F175D3DCCD1}">
-              <a14:hiddenFill xmlns:a14="http://schemas.microsoft.com/office/drawing/2010/main" xmlns="">
+              <a14:hiddenFill xmlns="" xmlns:a14="http://schemas.microsoft.com/office/drawing/2010/main">
                 <a:solidFill>
                   <a:schemeClr val="accent1"/>
                 </a:solidFill>
               </a14:hiddenFill>
             </a:ext>
             <a:ext uri="{91240B29-F687-4F45-9708-019B960494DF}">
-              <a14:hiddenLine xmlns:a14="http://schemas.microsoft.com/office/drawing/2010/main" xmlns="" w="9525">
+              <a14:hiddenLine xmlns="" xmlns:a14="http://schemas.microsoft.com/office/drawing/2010/main" w="9525">
                 <a:solidFill>
                   <a:schemeClr val="tx1"/>
                 </a:solidFill>
@@ -291,7 +290,7 @@
               </a14:hiddenLine>
             </a:ext>
             <a:ext uri="{AF507438-7753-43E0-B8FC-AC1667EBCBE1}">
-              <a14:hiddenEffects xmlns:a14="http://schemas.microsoft.com/office/drawing/2010/main" xmlns="">
+              <a14:hiddenEffects xmlns="" xmlns:a14="http://schemas.microsoft.com/office/drawing/2010/main">
                 <a:effectLst>
                   <a:outerShdw dist="35921" dir="2700000" algn="ctr" rotWithShape="0">
                     <a:schemeClr val="bg2"/>
@@ -377,14 +376,14 @@
           <a:effectLst/>
           <a:extLst>
             <a:ext uri="{909E8E84-426E-40DD-AFC4-6F175D3DCCD1}">
-              <a14:hiddenFill xmlns:a14="http://schemas.microsoft.com/office/drawing/2010/main" xmlns="">
+              <a14:hiddenFill xmlns="" xmlns:a14="http://schemas.microsoft.com/office/drawing/2010/main">
                 <a:solidFill>
                   <a:schemeClr val="accent1"/>
                 </a:solidFill>
               </a14:hiddenFill>
             </a:ext>
             <a:ext uri="{91240B29-F687-4F45-9708-019B960494DF}">
-              <a14:hiddenLine xmlns:a14="http://schemas.microsoft.com/office/drawing/2010/main" xmlns="" w="9525">
+              <a14:hiddenLine xmlns="" xmlns:a14="http://schemas.microsoft.com/office/drawing/2010/main" w="9525">
                 <a:solidFill>
                   <a:schemeClr val="tx1"/>
                 </a:solidFill>
@@ -394,7 +393,7 @@
               </a14:hiddenLine>
             </a:ext>
             <a:ext uri="{AF507438-7753-43E0-B8FC-AC1667EBCBE1}">
-              <a14:hiddenEffects xmlns:a14="http://schemas.microsoft.com/office/drawing/2010/main" xmlns="">
+              <a14:hiddenEffects xmlns="" xmlns:a14="http://schemas.microsoft.com/office/drawing/2010/main">
                 <a:effectLst>
                   <a:outerShdw dist="35921" dir="2700000" algn="ctr" rotWithShape="0">
                     <a:schemeClr val="bg2"/>
@@ -473,14 +472,14 @@
           <a:effectLst/>
           <a:extLst>
             <a:ext uri="{909E8E84-426E-40DD-AFC4-6F175D3DCCD1}">
-              <a14:hiddenFill xmlns:a14="http://schemas.microsoft.com/office/drawing/2010/main" xmlns="">
+              <a14:hiddenFill xmlns="" xmlns:a14="http://schemas.microsoft.com/office/drawing/2010/main">
                 <a:solidFill>
                   <a:schemeClr val="accent1"/>
                 </a:solidFill>
               </a14:hiddenFill>
             </a:ext>
             <a:ext uri="{91240B29-F687-4F45-9708-019B960494DF}">
-              <a14:hiddenLine xmlns:a14="http://schemas.microsoft.com/office/drawing/2010/main" xmlns="" w="9525">
+              <a14:hiddenLine xmlns="" xmlns:a14="http://schemas.microsoft.com/office/drawing/2010/main" w="9525">
                 <a:solidFill>
                   <a:schemeClr val="tx1"/>
                 </a:solidFill>
@@ -490,7 +489,7 @@
               </a14:hiddenLine>
             </a:ext>
             <a:ext uri="{AF507438-7753-43E0-B8FC-AC1667EBCBE1}">
-              <a14:hiddenEffects xmlns:a14="http://schemas.microsoft.com/office/drawing/2010/main" xmlns="">
+              <a14:hiddenEffects xmlns="" xmlns:a14="http://schemas.microsoft.com/office/drawing/2010/main">
                 <a:effectLst>
                   <a:outerShdw dist="35921" dir="2700000" algn="ctr" rotWithShape="0">
                     <a:schemeClr val="bg2"/>
@@ -546,14 +545,14 @@
           <a:effectLst/>
           <a:extLst>
             <a:ext uri="{909E8E84-426E-40DD-AFC4-6F175D3DCCD1}">
-              <a14:hiddenFill xmlns:a14="http://schemas.microsoft.com/office/drawing/2010/main" xmlns="">
+              <a14:hiddenFill xmlns="" xmlns:a14="http://schemas.microsoft.com/office/drawing/2010/main">
                 <a:solidFill>
                   <a:schemeClr val="accent1"/>
                 </a:solidFill>
               </a14:hiddenFill>
             </a:ext>
             <a:ext uri="{91240B29-F687-4F45-9708-019B960494DF}">
-              <a14:hiddenLine xmlns:a14="http://schemas.microsoft.com/office/drawing/2010/main" xmlns="" w="9525">
+              <a14:hiddenLine xmlns="" xmlns:a14="http://schemas.microsoft.com/office/drawing/2010/main" w="9525">
                 <a:solidFill>
                   <a:schemeClr val="tx1"/>
                 </a:solidFill>
@@ -563,7 +562,7 @@
               </a14:hiddenLine>
             </a:ext>
             <a:ext uri="{AF507438-7753-43E0-B8FC-AC1667EBCBE1}">
-              <a14:hiddenEffects xmlns:a14="http://schemas.microsoft.com/office/drawing/2010/main" xmlns="">
+              <a14:hiddenEffects xmlns="" xmlns:a14="http://schemas.microsoft.com/office/drawing/2010/main">
                 <a:effectLst>
                   <a:outerShdw dist="35921" dir="2700000" algn="ctr" rotWithShape="0">
                     <a:schemeClr val="bg2"/>
@@ -597,7 +596,7 @@
     </p:spTree>
     <p:extLst>
       <p:ext uri="{BB962C8B-B14F-4D97-AF65-F5344CB8AC3E}">
-        <p14:creationId xmlns:p14="http://schemas.microsoft.com/office/powerpoint/2010/main" xmlns="" val="2422806671"/>
+        <p14:creationId xmlns="" xmlns:p14="http://schemas.microsoft.com/office/powerpoint/2010/main" val="2422806671"/>
       </p:ext>
     </p:extLst>
   </p:cSld>
@@ -855,18 +854,7 @@
                 <a:ea typeface="+mn-ea"/>
                 <a:cs typeface="+mn-cs"/>
               </a:rPr>
-              <a:t>Login </a:t>
-            </a:r>
-            <a:r>
-              <a:rPr lang="en-US" sz="1200" b="0" i="0" u="none" strike="noStrike" kern="1200" dirty="0" smtClean="0">
-                <a:solidFill>
-                  <a:schemeClr val="tx1"/>
-                </a:solidFill>
-                <a:latin typeface="Arial" panose="020B0604020202020204" pitchFamily="34" charset="0"/>
-                <a:ea typeface="+mn-ea"/>
-                <a:cs typeface="+mn-cs"/>
-              </a:rPr>
-              <a:t>&amp; Navigation</a:t>
+              <a:t>Login &amp; Navigation</a:t>
             </a:r>
             <a:r>
               <a:rPr lang="en-US" dirty="0" smtClean="0"/>
@@ -934,7 +922,6 @@
               <a:rPr lang="en-US" dirty="0" smtClean="0"/>
               <a:t> </a:t>
             </a:r>
-            <a:endParaRPr lang="en-US" dirty="0" smtClean="0"/>
           </a:p>
           <a:p>
             <a:r>
@@ -965,11 +952,7 @@
             </a:r>
             <a:r>
               <a:rPr lang="en-US" dirty="0" smtClean="0"/>
-              <a:t> </a:t>
-            </a:r>
-            <a:r>
-              <a:rPr lang="en-US" dirty="0" smtClean="0"/>
-              <a:t>- </a:t>
+              <a:t> - </a:t>
             </a:r>
             <a:r>
               <a:rPr lang="en-US" sz="1200" b="0" i="0" u="none" strike="noStrike" kern="1200" dirty="0" smtClean="0">
@@ -986,7 +969,6 @@
               <a:rPr lang="en-US" dirty="0" smtClean="0"/>
               <a:t> </a:t>
             </a:r>
-            <a:endParaRPr lang="en-US" dirty="0" smtClean="0"/>
           </a:p>
           <a:p>
             <a:r>
@@ -3830,14 +3812,14 @@
           <a:effectLst/>
           <a:extLst>
             <a:ext uri="{909E8E84-426E-40DD-AFC4-6F175D3DCCD1}">
-              <a14:hiddenFill xmlns:a14="http://schemas.microsoft.com/office/drawing/2010/main" xmlns="">
+              <a14:hiddenFill xmlns="" xmlns:a14="http://schemas.microsoft.com/office/drawing/2010/main">
                 <a:solidFill>
                   <a:schemeClr val="accent1"/>
                 </a:solidFill>
               </a14:hiddenFill>
             </a:ext>
             <a:ext uri="{91240B29-F687-4F45-9708-019B960494DF}">
-              <a14:hiddenLine xmlns:a14="http://schemas.microsoft.com/office/drawing/2010/main" xmlns="" w="9525">
+              <a14:hiddenLine xmlns="" xmlns:a14="http://schemas.microsoft.com/office/drawing/2010/main" w="9525">
                 <a:solidFill>
                   <a:schemeClr val="tx1"/>
                 </a:solidFill>
@@ -3847,7 +3829,7 @@
               </a14:hiddenLine>
             </a:ext>
             <a:ext uri="{AF507438-7753-43E0-B8FC-AC1667EBCBE1}">
-              <a14:hiddenEffects xmlns:a14="http://schemas.microsoft.com/office/drawing/2010/main" xmlns="">
+              <a14:hiddenEffects xmlns="" xmlns:a14="http://schemas.microsoft.com/office/drawing/2010/main">
                 <a:effectLst>
                   <a:outerShdw dist="35921" dir="2700000" algn="ctr" rotWithShape="0">
                     <a:schemeClr val="bg2"/>
@@ -3903,14 +3885,14 @@
           <a:effectLst/>
           <a:extLst>
             <a:ext uri="{909E8E84-426E-40DD-AFC4-6F175D3DCCD1}">
-              <a14:hiddenFill xmlns:a14="http://schemas.microsoft.com/office/drawing/2010/main" xmlns="">
+              <a14:hiddenFill xmlns="" xmlns:a14="http://schemas.microsoft.com/office/drawing/2010/main">
                 <a:solidFill>
                   <a:schemeClr val="accent1"/>
                 </a:solidFill>
               </a14:hiddenFill>
             </a:ext>
             <a:ext uri="{91240B29-F687-4F45-9708-019B960494DF}">
-              <a14:hiddenLine xmlns:a14="http://schemas.microsoft.com/office/drawing/2010/main" xmlns="" w="9525">
+              <a14:hiddenLine xmlns="" xmlns:a14="http://schemas.microsoft.com/office/drawing/2010/main" w="9525">
                 <a:solidFill>
                   <a:schemeClr val="tx1"/>
                 </a:solidFill>
@@ -3920,7 +3902,7 @@
               </a14:hiddenLine>
             </a:ext>
             <a:ext uri="{AF507438-7753-43E0-B8FC-AC1667EBCBE1}">
-              <a14:hiddenEffects xmlns:a14="http://schemas.microsoft.com/office/drawing/2010/main" xmlns="">
+              <a14:hiddenEffects xmlns="" xmlns:a14="http://schemas.microsoft.com/office/drawing/2010/main">
                 <a:effectLst>
                   <a:outerShdw dist="35921" dir="2700000" algn="ctr" rotWithShape="0">
                     <a:schemeClr val="bg2"/>
@@ -3976,14 +3958,14 @@
           <a:effectLst/>
           <a:extLst>
             <a:ext uri="{909E8E84-426E-40DD-AFC4-6F175D3DCCD1}">
-              <a14:hiddenFill xmlns:a14="http://schemas.microsoft.com/office/drawing/2010/main" xmlns="">
+              <a14:hiddenFill xmlns="" xmlns:a14="http://schemas.microsoft.com/office/drawing/2010/main">
                 <a:solidFill>
                   <a:schemeClr val="accent1"/>
                 </a:solidFill>
               </a14:hiddenFill>
             </a:ext>
             <a:ext uri="{91240B29-F687-4F45-9708-019B960494DF}">
-              <a14:hiddenLine xmlns:a14="http://schemas.microsoft.com/office/drawing/2010/main" xmlns="" w="9525">
+              <a14:hiddenLine xmlns="" xmlns:a14="http://schemas.microsoft.com/office/drawing/2010/main" w="9525">
                 <a:solidFill>
                   <a:schemeClr val="tx1"/>
                 </a:solidFill>
@@ -3993,7 +3975,7 @@
               </a14:hiddenLine>
             </a:ext>
             <a:ext uri="{AF507438-7753-43E0-B8FC-AC1667EBCBE1}">
-              <a14:hiddenEffects xmlns:a14="http://schemas.microsoft.com/office/drawing/2010/main" xmlns="">
+              <a14:hiddenEffects xmlns="" xmlns:a14="http://schemas.microsoft.com/office/drawing/2010/main">
                 <a:effectLst>
                   <a:outerShdw dist="35921" dir="2700000" algn="ctr" rotWithShape="0">
                     <a:schemeClr val="bg2"/>
@@ -4635,14 +4617,14 @@
           <a:effectLst/>
           <a:extLst>
             <a:ext uri="{909E8E84-426E-40DD-AFC4-6F175D3DCCD1}">
-              <a14:hiddenFill xmlns:a14="http://schemas.microsoft.com/office/drawing/2010/main" xmlns="">
+              <a14:hiddenFill xmlns="" xmlns:a14="http://schemas.microsoft.com/office/drawing/2010/main">
                 <a:solidFill>
                   <a:schemeClr val="accent1"/>
                 </a:solidFill>
               </a14:hiddenFill>
             </a:ext>
             <a:ext uri="{91240B29-F687-4F45-9708-019B960494DF}">
-              <a14:hiddenLine xmlns:a14="http://schemas.microsoft.com/office/drawing/2010/main" xmlns="" w="9525">
+              <a14:hiddenLine xmlns="" xmlns:a14="http://schemas.microsoft.com/office/drawing/2010/main" w="9525">
                 <a:solidFill>
                   <a:schemeClr val="tx1"/>
                 </a:solidFill>
@@ -4652,7 +4634,7 @@
               </a14:hiddenLine>
             </a:ext>
             <a:ext uri="{AF507438-7753-43E0-B8FC-AC1667EBCBE1}">
-              <a14:hiddenEffects xmlns:a14="http://schemas.microsoft.com/office/drawing/2010/main" xmlns="">
+              <a14:hiddenEffects xmlns="" xmlns:a14="http://schemas.microsoft.com/office/drawing/2010/main">
                 <a:effectLst>
                   <a:outerShdw dist="35921" dir="2700000" algn="ctr" rotWithShape="0">
                     <a:schemeClr val="bg2"/>
@@ -6637,8 +6619,24 @@
               <a:buChar char="v"/>
             </a:pPr>
             <a:r>
+              <a:rPr lang="en-US" altLang="en-US" sz="2000" smtClean="0"/>
+              <a:t>Review </a:t>
+            </a:r>
+            <a:r>
+              <a:rPr lang="en-US" altLang="en-US" sz="2000" smtClean="0"/>
+              <a:t>how </a:t>
+            </a:r>
+            <a:r>
+              <a:rPr lang="en-US" altLang="en-US" sz="2000" smtClean="0"/>
+              <a:t>it </a:t>
+            </a:r>
+            <a:r>
+              <a:rPr lang="en-US" altLang="en-US" sz="2000" smtClean="0"/>
+              <a:t>hangs </a:t>
+            </a:r>
+            <a:r>
               <a:rPr lang="en-US" altLang="en-US" sz="2000" dirty="0" smtClean="0"/>
-              <a:t>Review of how it all hangs together.</a:t>
+              <a:t>together.</a:t>
             </a:r>
           </a:p>
           <a:p>
@@ -6651,11 +6649,11 @@
             </a:pPr>
             <a:r>
               <a:rPr lang="en-US" altLang="en-US" sz="2000" dirty="0" smtClean="0"/>
-              <a:t>“Kick the tires” – Are </a:t>
-            </a:r>
-            <a:r>
-              <a:rPr lang="en-US" altLang="en-US" sz="2000" smtClean="0"/>
-              <a:t>we having fun yet?</a:t>
+              <a:t>“Kick the </a:t>
+            </a:r>
+            <a:r>
+              <a:rPr lang="en-US" altLang="en-US" sz="2000" dirty="0" smtClean="0"/>
+              <a:t>tires”</a:t>
             </a:r>
             <a:endParaRPr lang="en-US" altLang="en-US" sz="2000" dirty="0" smtClean="0"/>
           </a:p>
@@ -6736,275 +6734,6 @@
         </p:nvPicPr>
         <p:blipFill>
           <a:blip r:embed="rId5" cstate="print"/>
-          <a:srcRect/>
-          <a:stretch>
-            <a:fillRect/>
-          </a:stretch>
-        </p:blipFill>
-        <p:spPr bwMode="auto">
-          <a:xfrm>
-            <a:off x="228600" y="152400"/>
-            <a:ext cx="771525" cy="571500"/>
-          </a:xfrm>
-          <a:prstGeom prst="rect">
-            <a:avLst/>
-          </a:prstGeom>
-          <a:noFill/>
-          <a:ln w="9525">
-            <a:noFill/>
-            <a:miter lim="800000"/>
-            <a:headEnd/>
-            <a:tailEnd/>
-          </a:ln>
-        </p:spPr>
-      </p:pic>
-    </p:spTree>
-  </p:cSld>
-  <p:clrMapOvr>
-    <a:masterClrMapping/>
-  </p:clrMapOvr>
-  <p:timing>
-    <p:tnLst>
-      <p:par>
-        <p:cTn id="1" dur="indefinite" restart="never" nodeType="tmRoot"/>
-      </p:par>
-    </p:tnLst>
-  </p:timing>
-</p:sld>
-</file>
-
-<file path=ppt/slides/slide12.xml><?xml version="1.0" encoding="utf-8"?>
-<p:sld xmlns:a="http://schemas.openxmlformats.org/drawingml/2006/main" xmlns:r="http://schemas.openxmlformats.org/officeDocument/2006/relationships" xmlns:p="http://schemas.openxmlformats.org/presentationml/2006/main">
-  <p:cSld>
-    <p:spTree>
-      <p:nvGrpSpPr>
-        <p:cNvPr id="1" name=""/>
-        <p:cNvGrpSpPr/>
-        <p:nvPr/>
-      </p:nvGrpSpPr>
-      <p:grpSpPr>
-        <a:xfrm>
-          <a:off x="0" y="0"/>
-          <a:ext cx="0" cy="0"/>
-          <a:chOff x="0" y="0"/>
-          <a:chExt cx="0" cy="0"/>
-        </a:xfrm>
-      </p:grpSpPr>
-      <p:sp>
-        <p:nvSpPr>
-          <p:cNvPr id="13314" name="Slide Number Placeholder 5"/>
-          <p:cNvSpPr>
-            <a:spLocks noGrp="1"/>
-          </p:cNvSpPr>
-          <p:nvPr>
-            <p:ph type="sldNum" sz="quarter" idx="12"/>
-          </p:nvPr>
-        </p:nvSpPr>
-        <p:spPr>
-          <a:noFill/>
-          <a:ln>
-            <a:miter lim="800000"/>
-            <a:headEnd/>
-            <a:tailEnd/>
-          </a:ln>
-        </p:spPr>
-        <p:txBody>
-          <a:bodyPr/>
-          <a:lstStyle/>
-          <a:p>
-            <a:fld id="{74C1B1A4-249C-4991-89F3-4953ED18B23C}" type="slidenum">
-              <a:rPr lang="en-US" altLang="en-US"/>
-              <a:pPr/>
-              <a:t>12</a:t>
-            </a:fld>
-            <a:endParaRPr lang="en-US" altLang="en-US"/>
-          </a:p>
-        </p:txBody>
-      </p:sp>
-      <p:sp>
-        <p:nvSpPr>
-          <p:cNvPr id="13315" name="Rectangle 2"/>
-          <p:cNvSpPr>
-            <a:spLocks noGrp="1" noChangeArrowheads="1"/>
-          </p:cNvSpPr>
-          <p:nvPr>
-            <p:ph type="title"/>
-          </p:nvPr>
-        </p:nvSpPr>
-        <p:spPr>
-          <a:xfrm>
-            <a:off x="1752600" y="152400"/>
-            <a:ext cx="6781800" cy="838200"/>
-          </a:xfrm>
-        </p:spPr>
-        <p:txBody>
-          <a:bodyPr/>
-          <a:lstStyle/>
-          <a:p>
-            <a:pPr algn="r" eaLnBrk="1" hangingPunct="1"/>
-            <a:r>
-              <a:rPr lang="en-US" altLang="en-US" sz="3600" b="1" dirty="0" smtClean="0">
-                <a:latin typeface="Felix Titling" pitchFamily="82" charset="0"/>
-              </a:rPr>
-              <a:t>DISCUSSION – Status</a:t>
-            </a:r>
-          </a:p>
-        </p:txBody>
-      </p:sp>
-      <p:sp>
-        <p:nvSpPr>
-          <p:cNvPr id="13316" name="Rectangle 3"/>
-          <p:cNvSpPr>
-            <a:spLocks noGrp="1" noChangeArrowheads="1"/>
-          </p:cNvSpPr>
-          <p:nvPr>
-            <p:ph type="body" idx="1"/>
-          </p:nvPr>
-        </p:nvSpPr>
-        <p:spPr>
-          <a:xfrm>
-            <a:off x="479425" y="1284288"/>
-            <a:ext cx="8229600" cy="4659312"/>
-          </a:xfrm>
-        </p:spPr>
-        <p:txBody>
-          <a:bodyPr/>
-          <a:lstStyle/>
-          <a:p>
-            <a:pPr marL="457200" indent="-457200">
-              <a:lnSpc>
-                <a:spcPct val="200000"/>
-              </a:lnSpc>
-              <a:spcBef>
-                <a:spcPct val="50000"/>
-              </a:spcBef>
-              <a:buFont typeface="Wingdings" pitchFamily="2" charset="2"/>
-              <a:buChar char="v"/>
-            </a:pPr>
-            <a:r>
-              <a:rPr lang="en-US" altLang="en-US" sz="2000" dirty="0" smtClean="0"/>
-              <a:t>‘Proof of Concept’ test created / demonstrated</a:t>
-            </a:r>
-            <a:r>
-              <a:rPr lang="en-US" altLang="en-US" sz="2000" dirty="0" smtClean="0"/>
-              <a:t>.</a:t>
-            </a:r>
-          </a:p>
-          <a:p>
-            <a:pPr marL="457200" indent="-457200">
-              <a:lnSpc>
-                <a:spcPct val="200000"/>
-              </a:lnSpc>
-              <a:spcBef>
-                <a:spcPct val="50000"/>
-              </a:spcBef>
-              <a:buFont typeface="Wingdings" pitchFamily="2" charset="2"/>
-              <a:buChar char="v"/>
-            </a:pPr>
-            <a:r>
-              <a:rPr lang="en-US" altLang="en-US" sz="2000" dirty="0" smtClean="0"/>
-              <a:t>Runs on Windows &amp; Linux (</a:t>
-            </a:r>
-            <a:r>
-              <a:rPr lang="en-US" altLang="en-US" sz="2000" dirty="0" err="1" smtClean="0"/>
-              <a:t>Ubuntu</a:t>
-            </a:r>
-            <a:r>
-              <a:rPr lang="en-US" altLang="en-US" sz="2000" dirty="0" smtClean="0"/>
-              <a:t>.)</a:t>
-            </a:r>
-            <a:endParaRPr lang="en-US" altLang="en-US" sz="2000" dirty="0" smtClean="0"/>
-          </a:p>
-          <a:p>
-            <a:pPr marL="457200" indent="-457200">
-              <a:lnSpc>
-                <a:spcPct val="200000"/>
-              </a:lnSpc>
-              <a:spcBef>
-                <a:spcPct val="50000"/>
-              </a:spcBef>
-              <a:buFont typeface="Wingdings" pitchFamily="2" charset="2"/>
-              <a:buChar char="v"/>
-            </a:pPr>
-            <a:r>
-              <a:rPr lang="en-US" altLang="en-US" sz="2000" dirty="0" smtClean="0"/>
-              <a:t>First draft of user documentation prepared.</a:t>
-            </a:r>
-          </a:p>
-          <a:p>
-            <a:pPr marL="457200" indent="-457200">
-              <a:lnSpc>
-                <a:spcPct val="200000"/>
-              </a:lnSpc>
-              <a:spcBef>
-                <a:spcPct val="50000"/>
-              </a:spcBef>
-              <a:buFont typeface="Wingdings" pitchFamily="2" charset="2"/>
-              <a:buChar char="v"/>
-            </a:pPr>
-            <a:r>
-              <a:rPr lang="en-US" altLang="en-US" sz="2000" dirty="0" smtClean="0"/>
-              <a:t>Creation of spreadsheets </a:t>
-            </a:r>
-            <a:r>
-              <a:rPr lang="en-US" altLang="en-US" sz="2000" smtClean="0"/>
-              <a:t>/ input is </a:t>
-            </a:r>
-            <a:r>
-              <a:rPr lang="en-US" altLang="en-US" sz="2000" dirty="0" smtClean="0"/>
-              <a:t>manual / laborious.</a:t>
-            </a:r>
-          </a:p>
-          <a:p>
-            <a:pPr marL="457200" indent="-457200">
-              <a:lnSpc>
-                <a:spcPct val="200000"/>
-              </a:lnSpc>
-              <a:spcBef>
-                <a:spcPct val="50000"/>
-              </a:spcBef>
-              <a:buFont typeface="Wingdings" pitchFamily="2" charset="2"/>
-              <a:buChar char="v"/>
-            </a:pPr>
-            <a:r>
-              <a:rPr lang="en-US" altLang="en-US" sz="2000" dirty="0" smtClean="0"/>
-              <a:t>Reporting &amp; CI integration need improvement.</a:t>
-            </a:r>
-            <a:endParaRPr lang="en-US" altLang="en-US" sz="2000" dirty="0" smtClean="0"/>
-          </a:p>
-          <a:p>
-            <a:pPr marL="457200" indent="-457200">
-              <a:lnSpc>
-                <a:spcPct val="200000"/>
-              </a:lnSpc>
-              <a:spcBef>
-                <a:spcPct val="50000"/>
-              </a:spcBef>
-              <a:buFont typeface="Wingdings" pitchFamily="2" charset="2"/>
-              <a:buChar char="v"/>
-            </a:pPr>
-            <a:r>
-              <a:rPr lang="en-US" altLang="en-US" sz="2000" dirty="0" smtClean="0"/>
-              <a:t>Pending </a:t>
-            </a:r>
-            <a:r>
-              <a:rPr lang="en-US" altLang="en-US" sz="2000" dirty="0" smtClean="0"/>
-              <a:t>html parsing for facilitating creation of input.</a:t>
-            </a:r>
-            <a:endParaRPr lang="en-US" altLang="en-US" sz="2000" dirty="0" smtClean="0"/>
-          </a:p>
-        </p:txBody>
-      </p:sp>
-      <p:pic>
-        <p:nvPicPr>
-          <p:cNvPr id="13317" name="Picture 5" descr="ddt"/>
-          <p:cNvPicPr>
-            <a:picLocks noChangeAspect="1" noChangeArrowheads="1"/>
-          </p:cNvPicPr>
-          <p:nvPr/>
-        </p:nvPicPr>
-        <p:blipFill>
-          <a:blip r:embed="rId2" cstate="print"/>
           <a:srcRect/>
           <a:stretch>
             <a:fillRect/>
@@ -9574,13 +9303,7 @@
               <a:rPr lang="en-US" altLang="en-US" sz="1600" dirty="0" smtClean="0">
                 <a:cs typeface="Arial" charset="0"/>
               </a:rPr>
-              <a:t>One ‘script’ per one test case (or unit test) - a maintenance nightmare as any non-trivial application may give rise to billions of test cases</a:t>
-            </a:r>
-            <a:r>
-              <a:rPr lang="en-US" altLang="en-US" sz="1600" dirty="0" smtClean="0">
-                <a:cs typeface="Arial" charset="0"/>
-              </a:rPr>
-              <a:t>.</a:t>
+              <a:t>One ‘script’ per one test case (or unit test) - a maintenance nightmare as any non-trivial application may give rise to billions of test cases.</a:t>
             </a:r>
           </a:p>
           <a:p>
@@ -9594,9 +9317,6 @@
               </a:rPr>
               <a:t>The maintenance chore is carried by developers – very expensive resource.</a:t>
             </a:r>
-            <a:endParaRPr lang="en-US" altLang="en-US" sz="1600" dirty="0" smtClean="0">
-              <a:cs typeface="Arial" charset="0"/>
-            </a:endParaRPr>
           </a:p>
           <a:p>
             <a:pPr lvl="1" eaLnBrk="1" hangingPunct="1">
@@ -11025,11 +10745,7 @@
             </a:r>
             <a:r>
               <a:rPr lang="en-US" altLang="en-US" sz="1600" dirty="0" smtClean="0"/>
-              <a:t>, html) </a:t>
-            </a:r>
-            <a:r>
-              <a:rPr lang="en-US" altLang="en-US" sz="1600" dirty="0" smtClean="0"/>
-              <a:t>is parsed to activate and validate the AUT.</a:t>
+              <a:t>, html) is parsed to activate and validate the AUT.</a:t>
             </a:r>
           </a:p>
           <a:p>
@@ -11107,13 +10823,8 @@
             </a:pPr>
             <a:r>
               <a:rPr lang="en-US" altLang="en-US" sz="1600" dirty="0" smtClean="0"/>
-              <a:t>Test logic refactoring based on patterns shared amongst AUT </a:t>
-            </a:r>
-            <a:r>
-              <a:rPr lang="en-US" altLang="en-US" sz="1600" dirty="0" smtClean="0"/>
-              <a:t>modules (CRUD).</a:t>
-            </a:r>
-            <a:endParaRPr lang="en-US" altLang="en-US" sz="1600" dirty="0" smtClean="0"/>
+              <a:t>Test logic refactoring based on patterns shared amongst AUT modules (CRUD).</a:t>
+            </a:r>
           </a:p>
           <a:p>
             <a:pPr lvl="1" eaLnBrk="1" hangingPunct="1">
@@ -11125,13 +10836,8 @@
             </a:pPr>
             <a:r>
               <a:rPr lang="en-US" altLang="en-US" sz="1600" dirty="0" smtClean="0"/>
-              <a:t>User defined variables (static and </a:t>
-            </a:r>
-            <a:r>
-              <a:rPr lang="en-US" altLang="en-US" sz="1600" dirty="0" smtClean="0"/>
-              <a:t>dynamic – using values from the UI.)</a:t>
-            </a:r>
-            <a:endParaRPr lang="en-US" altLang="en-US" sz="1600" dirty="0" smtClean="0"/>
+              <a:t>User defined variables (static and dynamic – using values from the UI.)</a:t>
+            </a:r>
           </a:p>
           <a:p>
             <a:pPr eaLnBrk="1" hangingPunct="1">
@@ -11169,15 +10875,7 @@
             </a:pPr>
             <a:r>
               <a:rPr lang="en-US" altLang="en-US" sz="1600" dirty="0" smtClean="0"/>
-              <a:t>Changes in the application are addressed with no </a:t>
-            </a:r>
-            <a:r>
-              <a:rPr lang="en-US" altLang="en-US" sz="1600" dirty="0" smtClean="0"/>
-              <a:t>/ minimal code </a:t>
-            </a:r>
-            <a:r>
-              <a:rPr lang="en-US" altLang="en-US" sz="1600" dirty="0" smtClean="0"/>
-              <a:t>changes.</a:t>
+              <a:t>Changes in the application are addressed with no / minimal code changes.</a:t>
             </a:r>
           </a:p>
           <a:p>
@@ -12032,13 +11730,8 @@
             </a:pPr>
             <a:r>
               <a:rPr lang="en-US" altLang="en-US" sz="2000" dirty="0" smtClean="0"/>
-              <a:t>Coding is optional – reserved for special </a:t>
-            </a:r>
-            <a:r>
-              <a:rPr lang="en-US" altLang="en-US" sz="2000" dirty="0" smtClean="0"/>
-              <a:t>cases.</a:t>
-            </a:r>
-            <a:endParaRPr lang="en-US" altLang="en-US" sz="2000" dirty="0" smtClean="0"/>
+              <a:t>Coding is optional – reserved for special cases.</a:t>
+            </a:r>
           </a:p>
           <a:p>
             <a:pPr eaLnBrk="1" hangingPunct="1">
@@ -13314,7 +13007,7 @@
   </a:extraClrSchemeLst>
   <a:extLst>
     <a:ext uri="{05A4C25C-085E-4340-85A3-A5531E510DB2}">
-      <thm15:themeFamily xmlns:thm15="http://schemas.microsoft.com/office/thememl/2012/main" xmlns="" name="Office Theme" id="{62F939B6-93AF-4DB8-9C6B-D6C7DFDC589F}" vid="{4A3C46E8-61CC-4603-A589-7422A47A8E4A}"/>
+      <thm15:themeFamily xmlns="" xmlns:thm15="http://schemas.microsoft.com/office/thememl/2012/main" name="Office Theme" id="{62F939B6-93AF-4DB8-9C6B-D6C7DFDC589F}" vid="{4A3C46E8-61CC-4603-A589-7422A47A8E4A}"/>
     </a:ext>
   </a:extLst>
 </a:theme>
@@ -13575,7 +13268,7 @@
   <a:extraClrSchemeLst/>
   <a:extLst>
     <a:ext uri="{05A4C25C-085E-4340-85A3-A5531E510DB2}">
-      <thm15:themeFamily xmlns:thm15="http://schemas.microsoft.com/office/thememl/2012/main" xmlns="" name="Office Theme" id="{62F939B6-93AF-4DB8-9C6B-D6C7DFDC589F}" vid="{4A3C46E8-61CC-4603-A589-7422A47A8E4A}"/>
+      <thm15:themeFamily xmlns="" xmlns:thm15="http://schemas.microsoft.com/office/thememl/2012/main" name="Office Theme" id="{62F939B6-93AF-4DB8-9C6B-D6C7DFDC589F}" vid="{4A3C46E8-61CC-4603-A589-7422A47A8E4A}"/>
     </a:ext>
   </a:extLst>
 </a:theme>

</xml_diff>